<commit_message>
Add a DigestCreator control for creation of digest messages
It is also run just after ingress, just like several of the new Packer
controls.  The intent is that now the IngressDeparser control will do
nothing but emit calls on headers, header stacks, and header_union
values.  Digest creation, which was formerly restricted to be done
within the IngressDeparser, would now be restricted to occur only in
the DigestCreator control.  It has a default EmptyDigestCreator
implementation that never generates any digest messages.
</commit_message>
<xml_diff>
--- a/p4-16/psa/figs/psa-packet-paths-complete-figure.pptx
+++ b/p4-16/psa/figs/psa-packet-paths-complete-figure.pptx
@@ -200,7 +200,7 @@
           <a:p>
             <a:fld id="{4D6A28A7-B5DA-F54D-BC8C-5DA25BBE1AAE}" type="datetimeFigureOut">
               <a:rPr lang="en-US" smtClean="0"/>
-              <a:t>4/29/19</a:t>
+              <a:t>5/3/19</a:t>
             </a:fld>
             <a:endParaRPr lang="en-US"/>
           </a:p>
@@ -598,7 +598,7 @@
           <a:p>
             <a:fld id="{A3ADF9FC-CD6C-AF49-B734-BD0B618A0685}" type="datetimeFigureOut">
               <a:rPr lang="en-US" smtClean="0"/>
-              <a:t>4/29/19</a:t>
+              <a:t>5/3/19</a:t>
             </a:fld>
             <a:endParaRPr lang="en-US"/>
           </a:p>
@@ -768,7 +768,7 @@
           <a:p>
             <a:fld id="{A3ADF9FC-CD6C-AF49-B734-BD0B618A0685}" type="datetimeFigureOut">
               <a:rPr lang="en-US" smtClean="0"/>
-              <a:t>4/29/19</a:t>
+              <a:t>5/3/19</a:t>
             </a:fld>
             <a:endParaRPr lang="en-US"/>
           </a:p>
@@ -948,7 +948,7 @@
           <a:p>
             <a:fld id="{A3ADF9FC-CD6C-AF49-B734-BD0B618A0685}" type="datetimeFigureOut">
               <a:rPr lang="en-US" smtClean="0"/>
-              <a:t>4/29/19</a:t>
+              <a:t>5/3/19</a:t>
             </a:fld>
             <a:endParaRPr lang="en-US"/>
           </a:p>
@@ -1118,7 +1118,7 @@
           <a:p>
             <a:fld id="{A3ADF9FC-CD6C-AF49-B734-BD0B618A0685}" type="datetimeFigureOut">
               <a:rPr lang="en-US" smtClean="0"/>
-              <a:t>4/29/19</a:t>
+              <a:t>5/3/19</a:t>
             </a:fld>
             <a:endParaRPr lang="en-US"/>
           </a:p>
@@ -1364,7 +1364,7 @@
           <a:p>
             <a:fld id="{A3ADF9FC-CD6C-AF49-B734-BD0B618A0685}" type="datetimeFigureOut">
               <a:rPr lang="en-US" smtClean="0"/>
-              <a:t>4/29/19</a:t>
+              <a:t>5/3/19</a:t>
             </a:fld>
             <a:endParaRPr lang="en-US"/>
           </a:p>
@@ -1596,7 +1596,7 @@
           <a:p>
             <a:fld id="{A3ADF9FC-CD6C-AF49-B734-BD0B618A0685}" type="datetimeFigureOut">
               <a:rPr lang="en-US" smtClean="0"/>
-              <a:t>4/29/19</a:t>
+              <a:t>5/3/19</a:t>
             </a:fld>
             <a:endParaRPr lang="en-US"/>
           </a:p>
@@ -1963,7 +1963,7 @@
           <a:p>
             <a:fld id="{A3ADF9FC-CD6C-AF49-B734-BD0B618A0685}" type="datetimeFigureOut">
               <a:rPr lang="en-US" smtClean="0"/>
-              <a:t>4/29/19</a:t>
+              <a:t>5/3/19</a:t>
             </a:fld>
             <a:endParaRPr lang="en-US"/>
           </a:p>
@@ -2081,7 +2081,7 @@
           <a:p>
             <a:fld id="{A3ADF9FC-CD6C-AF49-B734-BD0B618A0685}" type="datetimeFigureOut">
               <a:rPr lang="en-US" smtClean="0"/>
-              <a:t>4/29/19</a:t>
+              <a:t>5/3/19</a:t>
             </a:fld>
             <a:endParaRPr lang="en-US"/>
           </a:p>
@@ -2176,7 +2176,7 @@
           <a:p>
             <a:fld id="{A3ADF9FC-CD6C-AF49-B734-BD0B618A0685}" type="datetimeFigureOut">
               <a:rPr lang="en-US" smtClean="0"/>
-              <a:t>4/29/19</a:t>
+              <a:t>5/3/19</a:t>
             </a:fld>
             <a:endParaRPr lang="en-US"/>
           </a:p>
@@ -2453,7 +2453,7 @@
           <a:p>
             <a:fld id="{A3ADF9FC-CD6C-AF49-B734-BD0B618A0685}" type="datetimeFigureOut">
               <a:rPr lang="en-US" smtClean="0"/>
-              <a:t>4/29/19</a:t>
+              <a:t>5/3/19</a:t>
             </a:fld>
             <a:endParaRPr lang="en-US"/>
           </a:p>
@@ -2710,7 +2710,7 @@
           <a:p>
             <a:fld id="{A3ADF9FC-CD6C-AF49-B734-BD0B618A0685}" type="datetimeFigureOut">
               <a:rPr lang="en-US" smtClean="0"/>
-              <a:t>4/29/19</a:t>
+              <a:t>5/3/19</a:t>
             </a:fld>
             <a:endParaRPr lang="en-US"/>
           </a:p>
@@ -2923,7 +2923,7 @@
           <a:p>
             <a:fld id="{A3ADF9FC-CD6C-AF49-B734-BD0B618A0685}" type="datetimeFigureOut">
               <a:rPr lang="en-US" smtClean="0"/>
-              <a:t>4/29/19</a:t>
+              <a:t>5/3/19</a:t>
             </a:fld>
             <a:endParaRPr lang="en-US"/>
           </a:p>
@@ -3336,7 +3336,7 @@
         </p:nvSpPr>
         <p:spPr>
           <a:xfrm>
-            <a:off x="7928706" y="3346501"/>
+            <a:off x="8059335" y="3921267"/>
             <a:ext cx="1640717" cy="401717"/>
           </a:xfrm>
           <a:prstGeom prst="rect">
@@ -3393,7 +3393,7 @@
         </p:nvSpPr>
         <p:spPr>
           <a:xfrm>
-            <a:off x="6420581" y="2271088"/>
+            <a:off x="6551210" y="2845854"/>
             <a:ext cx="1242586" cy="542878"/>
           </a:xfrm>
           <a:prstGeom prst="rect">
@@ -3447,7 +3447,7 @@
         </p:nvSpPr>
         <p:spPr>
           <a:xfrm>
-            <a:off x="6420394" y="270333"/>
+            <a:off x="6551023" y="845099"/>
             <a:ext cx="1242774" cy="499669"/>
           </a:xfrm>
           <a:prstGeom prst="rect">
@@ -3500,8 +3500,8 @@
         </p:nvSpPr>
         <p:spPr>
           <a:xfrm>
-            <a:off x="4556039" y="270333"/>
-            <a:ext cx="1065395" cy="2543634"/>
+            <a:off x="4686668" y="161736"/>
+            <a:ext cx="1065395" cy="3226997"/>
           </a:xfrm>
           <a:prstGeom prst="rect">
             <a:avLst/>
@@ -3553,8 +3553,8 @@
         </p:nvSpPr>
         <p:spPr>
           <a:xfrm>
-            <a:off x="3218852" y="270333"/>
-            <a:ext cx="1065395" cy="2543634"/>
+            <a:off x="3349481" y="161736"/>
+            <a:ext cx="1065395" cy="3226997"/>
           </a:xfrm>
           <a:prstGeom prst="rect">
             <a:avLst/>
@@ -3610,7 +3610,7 @@
         </p:nvCxnSpPr>
         <p:spPr>
           <a:xfrm>
-            <a:off x="4284246" y="1542150"/>
+            <a:off x="4414876" y="1775235"/>
             <a:ext cx="271792" cy="0"/>
           </a:xfrm>
           <a:prstGeom prst="straightConnector1">
@@ -3649,7 +3649,7 @@
         </p:nvCxnSpPr>
         <p:spPr>
           <a:xfrm>
-            <a:off x="5621434" y="520167"/>
+            <a:off x="5752063" y="1094933"/>
             <a:ext cx="798961" cy="0"/>
           </a:xfrm>
           <a:prstGeom prst="straightConnector1">
@@ -3685,7 +3685,7 @@
         </p:nvSpPr>
         <p:spPr>
           <a:xfrm>
-            <a:off x="14440909" y="270332"/>
+            <a:off x="14571538" y="845098"/>
             <a:ext cx="1242586" cy="1137402"/>
           </a:xfrm>
           <a:prstGeom prst="rect">
@@ -3738,8 +3738,8 @@
         </p:nvSpPr>
         <p:spPr>
           <a:xfrm>
-            <a:off x="13109699" y="270332"/>
-            <a:ext cx="1065395" cy="2543635"/>
+            <a:off x="13240328" y="161736"/>
+            <a:ext cx="1065395" cy="3226997"/>
           </a:xfrm>
           <a:prstGeom prst="rect">
             <a:avLst/>
@@ -3791,8 +3791,8 @@
         </p:nvSpPr>
         <p:spPr>
           <a:xfrm>
-            <a:off x="11772512" y="270332"/>
-            <a:ext cx="1065395" cy="2543635"/>
+            <a:off x="11903141" y="161736"/>
+            <a:ext cx="1065395" cy="3226997"/>
           </a:xfrm>
           <a:prstGeom prst="rect">
             <a:avLst/>
@@ -3844,7 +3844,7 @@
         </p:nvCxnSpPr>
         <p:spPr>
           <a:xfrm>
-            <a:off x="12837906" y="1542149"/>
+            <a:off x="12968536" y="1775967"/>
             <a:ext cx="271792" cy="0"/>
           </a:xfrm>
           <a:prstGeom prst="straightConnector1">
@@ -3880,8 +3880,8 @@
         </p:nvSpPr>
         <p:spPr>
           <a:xfrm>
-            <a:off x="8064281" y="270333"/>
-            <a:ext cx="1263597" cy="2543635"/>
+            <a:off x="8194910" y="161737"/>
+            <a:ext cx="1263597" cy="3226998"/>
           </a:xfrm>
           <a:prstGeom prst="rect">
             <a:avLst/>
@@ -3977,7 +3977,7 @@
         </p:nvSpPr>
         <p:spPr>
           <a:xfrm>
-            <a:off x="2697386" y="634504"/>
+            <a:off x="2828015" y="1209270"/>
             <a:ext cx="247212" cy="2179463"/>
           </a:xfrm>
           <a:prstGeom prst="rect">
@@ -4030,8 +4030,8 @@
         </p:nvCxnSpPr>
         <p:spPr>
           <a:xfrm>
-            <a:off x="2944599" y="1542150"/>
-            <a:ext cx="274253" cy="0"/>
+            <a:off x="3075227" y="1775235"/>
+            <a:ext cx="274254" cy="0"/>
           </a:xfrm>
           <a:prstGeom prst="straightConnector1">
             <a:avLst/>
@@ -4068,7 +4068,7 @@
         </p:nvCxnSpPr>
         <p:spPr>
           <a:xfrm>
-            <a:off x="9327877" y="1191053"/>
+            <a:off x="9458506" y="1765819"/>
             <a:ext cx="388158" cy="0"/>
           </a:xfrm>
           <a:prstGeom prst="straightConnector1">
@@ -4104,7 +4104,7 @@
         </p:nvCxnSpPr>
         <p:spPr>
           <a:xfrm flipV="1">
-            <a:off x="7668964" y="2537736"/>
+            <a:off x="7799593" y="3112502"/>
             <a:ext cx="260555" cy="704"/>
           </a:xfrm>
           <a:prstGeom prst="straightConnector1">
@@ -4142,7 +4142,7 @@
         </p:nvCxnSpPr>
         <p:spPr>
           <a:xfrm>
-            <a:off x="7929518" y="2537736"/>
+            <a:off x="8060147" y="3112502"/>
             <a:ext cx="0" cy="781520"/>
           </a:xfrm>
           <a:prstGeom prst="straightConnector1">
@@ -4180,7 +4180,7 @@
         </p:nvCxnSpPr>
         <p:spPr>
           <a:xfrm flipH="1" flipV="1">
-            <a:off x="919716" y="3280706"/>
+            <a:off x="1050345" y="3855472"/>
             <a:ext cx="7009802" cy="38551"/>
           </a:xfrm>
           <a:prstGeom prst="straightConnector1">
@@ -4216,7 +4216,7 @@
         </p:nvCxnSpPr>
         <p:spPr>
           <a:xfrm>
-            <a:off x="919716" y="2564703"/>
+            <a:off x="1050345" y="3139469"/>
             <a:ext cx="0" cy="716003"/>
           </a:xfrm>
           <a:prstGeom prst="straightConnector1">
@@ -4252,7 +4252,7 @@
         </p:nvCxnSpPr>
         <p:spPr>
           <a:xfrm flipV="1">
-            <a:off x="919717" y="2567960"/>
+            <a:off x="1050346" y="3142726"/>
             <a:ext cx="260555" cy="704"/>
           </a:xfrm>
           <a:prstGeom prst="straightConnector1">
@@ -4288,7 +4288,7 @@
         </p:nvSpPr>
         <p:spPr>
           <a:xfrm>
-            <a:off x="4266760" y="2932308"/>
+            <a:off x="4397389" y="3507074"/>
             <a:ext cx="1227616" cy="401717"/>
           </a:xfrm>
           <a:prstGeom prst="rect">
@@ -4347,7 +4347,7 @@
         </p:nvCxnSpPr>
         <p:spPr>
           <a:xfrm flipV="1">
-            <a:off x="15689473" y="2545575"/>
+            <a:off x="15820102" y="3120341"/>
             <a:ext cx="238513" cy="2322"/>
           </a:xfrm>
           <a:prstGeom prst="straightConnector1">
@@ -4385,7 +4385,7 @@
         </p:nvCxnSpPr>
         <p:spPr>
           <a:xfrm>
-            <a:off x="15923232" y="2542527"/>
+            <a:off x="16053861" y="3117293"/>
             <a:ext cx="0" cy="767840"/>
           </a:xfrm>
           <a:prstGeom prst="straightConnector1">
@@ -4423,7 +4423,7 @@
         </p:nvCxnSpPr>
         <p:spPr>
           <a:xfrm flipH="1">
-            <a:off x="9439144" y="3310367"/>
+            <a:off x="9569773" y="3885133"/>
             <a:ext cx="6484088" cy="0"/>
           </a:xfrm>
           <a:prstGeom prst="straightConnector1">
@@ -4461,7 +4461,7 @@
         </p:nvCxnSpPr>
         <p:spPr>
           <a:xfrm>
-            <a:off x="9439142" y="2537737"/>
+            <a:off x="9569771" y="3112503"/>
             <a:ext cx="0" cy="772631"/>
           </a:xfrm>
           <a:prstGeom prst="straightConnector1">
@@ -4497,7 +4497,7 @@
         </p:nvCxnSpPr>
         <p:spPr>
           <a:xfrm flipV="1">
-            <a:off x="9439146" y="2537734"/>
+            <a:off x="9569775" y="3112500"/>
             <a:ext cx="260555" cy="704"/>
           </a:xfrm>
           <a:prstGeom prst="straightConnector1">
@@ -4533,7 +4533,7 @@
         </p:nvSpPr>
         <p:spPr>
           <a:xfrm>
-            <a:off x="12345292" y="2932308"/>
+            <a:off x="12475921" y="3507074"/>
             <a:ext cx="1227616" cy="401717"/>
           </a:xfrm>
           <a:prstGeom prst="rect">
@@ -4584,7 +4584,7 @@
         </p:nvCxnSpPr>
         <p:spPr>
           <a:xfrm flipV="1">
-            <a:off x="779363" y="1864228"/>
+            <a:off x="909992" y="2438994"/>
             <a:ext cx="400909" cy="7587"/>
           </a:xfrm>
           <a:prstGeom prst="straightConnector1">
@@ -4620,7 +4620,7 @@
         </p:nvCxnSpPr>
         <p:spPr>
           <a:xfrm flipV="1">
-            <a:off x="15676416" y="1828095"/>
+            <a:off x="15807045" y="2402861"/>
             <a:ext cx="400909" cy="7587"/>
           </a:xfrm>
           <a:prstGeom prst="straightConnector1">
@@ -4658,7 +4658,7 @@
         </p:nvCxnSpPr>
         <p:spPr>
           <a:xfrm>
-            <a:off x="16077324" y="1828094"/>
+            <a:off x="16207953" y="2402860"/>
             <a:ext cx="0" cy="1860338"/>
           </a:xfrm>
           <a:prstGeom prst="straightConnector1">
@@ -4696,7 +4696,7 @@
         </p:nvCxnSpPr>
         <p:spPr>
           <a:xfrm flipH="1">
-            <a:off x="779365" y="3688435"/>
+            <a:off x="909994" y="4263201"/>
             <a:ext cx="15297959" cy="0"/>
           </a:xfrm>
           <a:prstGeom prst="straightConnector1">
@@ -4734,7 +4734,7 @@
         </p:nvCxnSpPr>
         <p:spPr>
           <a:xfrm>
-            <a:off x="782174" y="1873094"/>
+            <a:off x="912803" y="2447860"/>
             <a:ext cx="0" cy="1815338"/>
           </a:xfrm>
           <a:prstGeom prst="straightConnector1">
@@ -4770,7 +4770,7 @@
         </p:nvCxnSpPr>
         <p:spPr>
           <a:xfrm>
-            <a:off x="15687724" y="966121"/>
+            <a:off x="15818353" y="1540887"/>
             <a:ext cx="821608" cy="4"/>
           </a:xfrm>
           <a:prstGeom prst="straightConnector1">
@@ -4806,7 +4806,7 @@
         </p:nvSpPr>
         <p:spPr>
           <a:xfrm>
-            <a:off x="15645153" y="658053"/>
+            <a:off x="15775782" y="1232819"/>
             <a:ext cx="851359" cy="310684"/>
           </a:xfrm>
           <a:prstGeom prst="rect">
@@ -4859,7 +4859,7 @@
         </p:nvCxnSpPr>
         <p:spPr>
           <a:xfrm>
-            <a:off x="15676416" y="592331"/>
+            <a:off x="15807045" y="1167097"/>
             <a:ext cx="832917" cy="0"/>
           </a:xfrm>
           <a:prstGeom prst="straightConnector1">
@@ -4895,7 +4895,7 @@
         </p:nvSpPr>
         <p:spPr>
           <a:xfrm>
-            <a:off x="15664416" y="270331"/>
+            <a:off x="15795045" y="845097"/>
             <a:ext cx="821608" cy="310684"/>
           </a:xfrm>
           <a:prstGeom prst="rect">
@@ -4952,7 +4952,7 @@
         </p:nvSpPr>
         <p:spPr>
           <a:xfrm>
-            <a:off x="1183008" y="1593171"/>
+            <a:off x="1313637" y="2167937"/>
             <a:ext cx="1242586" cy="542878"/>
           </a:xfrm>
           <a:prstGeom prst="rect">
@@ -5012,7 +5012,7 @@
         </p:nvSpPr>
         <p:spPr>
           <a:xfrm>
-            <a:off x="1183008" y="2271088"/>
+            <a:off x="1313637" y="2845854"/>
             <a:ext cx="1242586" cy="542878"/>
           </a:xfrm>
           <a:prstGeom prst="rect">
@@ -5072,7 +5072,7 @@
         </p:nvSpPr>
         <p:spPr>
           <a:xfrm>
-            <a:off x="1183008" y="634506"/>
+            <a:off x="1313637" y="1209272"/>
             <a:ext cx="1242586" cy="828083"/>
           </a:xfrm>
           <a:prstGeom prst="rect">
@@ -5148,7 +5148,7 @@
         </p:nvCxnSpPr>
         <p:spPr>
           <a:xfrm>
-            <a:off x="358663" y="1262206"/>
+            <a:off x="489292" y="1836972"/>
             <a:ext cx="821608" cy="4"/>
           </a:xfrm>
           <a:prstGeom prst="straightConnector1">
@@ -5190,7 +5190,7 @@
         </p:nvSpPr>
         <p:spPr>
           <a:xfrm>
-            <a:off x="323725" y="940206"/>
+            <a:off x="454354" y="1514972"/>
             <a:ext cx="821608" cy="310684"/>
           </a:xfrm>
           <a:prstGeom prst="rect">
@@ -5247,7 +5247,7 @@
         </p:nvCxnSpPr>
         <p:spPr>
           <a:xfrm>
-            <a:off x="346664" y="888416"/>
+            <a:off x="477293" y="1463182"/>
             <a:ext cx="821608" cy="4"/>
           </a:xfrm>
           <a:prstGeom prst="straightConnector1">
@@ -5289,7 +5289,7 @@
         </p:nvSpPr>
         <p:spPr>
           <a:xfrm>
-            <a:off x="311726" y="566416"/>
+            <a:off x="442355" y="1141182"/>
             <a:ext cx="821608" cy="310684"/>
           </a:xfrm>
           <a:prstGeom prst="rect">
@@ -5346,7 +5346,7 @@
         </p:nvCxnSpPr>
         <p:spPr>
           <a:xfrm>
-            <a:off x="2425594" y="1099700"/>
+            <a:off x="2556223" y="1674466"/>
             <a:ext cx="274250" cy="0"/>
           </a:xfrm>
           <a:prstGeom prst="straightConnector1">
@@ -5388,7 +5388,7 @@
         </p:nvCxnSpPr>
         <p:spPr>
           <a:xfrm>
-            <a:off x="2423136" y="1868021"/>
+            <a:off x="2553765" y="2442787"/>
             <a:ext cx="274250" cy="0"/>
           </a:xfrm>
           <a:prstGeom prst="straightConnector1">
@@ -5430,7 +5430,7 @@
         </p:nvCxnSpPr>
         <p:spPr>
           <a:xfrm>
-            <a:off x="2423136" y="2564702"/>
+            <a:off x="2553765" y="3139468"/>
             <a:ext cx="274250" cy="0"/>
           </a:xfrm>
           <a:prstGeom prst="straightConnector1">
@@ -5472,7 +5472,7 @@
         </p:nvSpPr>
         <p:spPr>
           <a:xfrm>
-            <a:off x="14444235" y="1575865"/>
+            <a:off x="14574864" y="2150631"/>
             <a:ext cx="1242586" cy="542878"/>
           </a:xfrm>
           <a:prstGeom prst="rect">
@@ -5532,7 +5532,7 @@
         </p:nvCxnSpPr>
         <p:spPr>
           <a:xfrm>
-            <a:off x="14169985" y="1835681"/>
+            <a:off x="14300614" y="2410447"/>
             <a:ext cx="274250" cy="0"/>
           </a:xfrm>
           <a:prstGeom prst="straightConnector1">
@@ -5574,7 +5574,7 @@
         </p:nvSpPr>
         <p:spPr>
           <a:xfrm>
-            <a:off x="14446886" y="2276458"/>
+            <a:off x="14577515" y="2851224"/>
             <a:ext cx="1242586" cy="542878"/>
           </a:xfrm>
           <a:prstGeom prst="rect">
@@ -5634,7 +5634,7 @@
         </p:nvCxnSpPr>
         <p:spPr>
           <a:xfrm>
-            <a:off x="14169985" y="2542527"/>
+            <a:off x="14300614" y="3117293"/>
             <a:ext cx="274250" cy="0"/>
           </a:xfrm>
           <a:prstGeom prst="straightConnector1">
@@ -5676,7 +5676,7 @@
         </p:nvSpPr>
         <p:spPr>
           <a:xfrm>
-            <a:off x="6420581" y="1593171"/>
+            <a:off x="6551210" y="2167937"/>
             <a:ext cx="1242586" cy="542878"/>
           </a:xfrm>
           <a:prstGeom prst="rect">
@@ -5736,7 +5736,7 @@
         </p:nvSpPr>
         <p:spPr>
           <a:xfrm>
-            <a:off x="5895683" y="1589876"/>
+            <a:off x="6026312" y="2164642"/>
             <a:ext cx="247212" cy="1224339"/>
           </a:xfrm>
           <a:prstGeom prst="rect">
@@ -5794,7 +5794,7 @@
         </p:nvCxnSpPr>
         <p:spPr>
           <a:xfrm>
-            <a:off x="5621434" y="1182147"/>
+            <a:off x="5752063" y="1756913"/>
             <a:ext cx="799148" cy="0"/>
           </a:xfrm>
           <a:prstGeom prst="straightConnector1">
@@ -5836,7 +5836,7 @@
         </p:nvSpPr>
         <p:spPr>
           <a:xfrm>
-            <a:off x="6420581" y="910708"/>
+            <a:off x="6551210" y="1485474"/>
             <a:ext cx="1242586" cy="542878"/>
           </a:xfrm>
           <a:prstGeom prst="rect">
@@ -5898,7 +5898,7 @@
         </p:nvCxnSpPr>
         <p:spPr>
           <a:xfrm>
-            <a:off x="6146329" y="1866444"/>
+            <a:off x="6276958" y="2441210"/>
             <a:ext cx="274253" cy="0"/>
           </a:xfrm>
           <a:prstGeom prst="straightConnector1">
@@ -5942,7 +5942,7 @@
         </p:nvCxnSpPr>
         <p:spPr>
           <a:xfrm>
-            <a:off x="6146329" y="2546465"/>
+            <a:off x="6276958" y="3121231"/>
             <a:ext cx="274253" cy="0"/>
           </a:xfrm>
           <a:prstGeom prst="straightConnector1">
@@ -5986,7 +5986,7 @@
         </p:nvCxnSpPr>
         <p:spPr>
           <a:xfrm>
-            <a:off x="5621434" y="2175572"/>
+            <a:off x="5752063" y="2750338"/>
             <a:ext cx="274253" cy="0"/>
           </a:xfrm>
           <a:prstGeom prst="straightConnector1">
@@ -6031,7 +6031,7 @@
         </p:nvCxnSpPr>
         <p:spPr>
           <a:xfrm>
-            <a:off x="14176755" y="839033"/>
+            <a:off x="14307384" y="1413799"/>
             <a:ext cx="264154" cy="0"/>
           </a:xfrm>
           <a:prstGeom prst="straightConnector1">
@@ -6073,7 +6073,7 @@
         </p:nvSpPr>
         <p:spPr>
           <a:xfrm>
-            <a:off x="9716035" y="2280090"/>
+            <a:off x="9846664" y="2854856"/>
             <a:ext cx="1242586" cy="542878"/>
           </a:xfrm>
           <a:prstGeom prst="rect">
@@ -6133,7 +6133,7 @@
         </p:nvSpPr>
         <p:spPr>
           <a:xfrm>
-            <a:off x="9716035" y="1602173"/>
+            <a:off x="9846664" y="2176939"/>
             <a:ext cx="1242586" cy="542878"/>
           </a:xfrm>
           <a:prstGeom prst="rect">
@@ -6193,7 +6193,7 @@
         </p:nvSpPr>
         <p:spPr>
           <a:xfrm>
-            <a:off x="11242046" y="922907"/>
+            <a:off x="11372675" y="1497673"/>
             <a:ext cx="247212" cy="1898808"/>
           </a:xfrm>
           <a:prstGeom prst="rect">
@@ -6251,7 +6251,7 @@
         </p:nvCxnSpPr>
         <p:spPr>
           <a:xfrm>
-            <a:off x="10967794" y="1191053"/>
+            <a:off x="11098423" y="1765819"/>
             <a:ext cx="274253" cy="0"/>
           </a:xfrm>
           <a:prstGeom prst="straightConnector1">
@@ -6293,7 +6293,7 @@
         </p:nvSpPr>
         <p:spPr>
           <a:xfrm>
-            <a:off x="9716035" y="919710"/>
+            <a:off x="9846664" y="1494476"/>
             <a:ext cx="1242586" cy="542878"/>
           </a:xfrm>
           <a:prstGeom prst="rect">
@@ -6355,7 +6355,7 @@
         </p:nvCxnSpPr>
         <p:spPr>
           <a:xfrm>
-            <a:off x="10958622" y="1871814"/>
+            <a:off x="11089251" y="2446580"/>
             <a:ext cx="274253" cy="0"/>
           </a:xfrm>
           <a:prstGeom prst="straightConnector1">
@@ -6399,7 +6399,7 @@
         </p:nvCxnSpPr>
         <p:spPr>
           <a:xfrm>
-            <a:off x="10967794" y="2537736"/>
+            <a:off x="11098423" y="3112502"/>
             <a:ext cx="274253" cy="0"/>
           </a:xfrm>
           <a:prstGeom prst="straightConnector1">
@@ -6443,7 +6443,7 @@
         </p:nvCxnSpPr>
         <p:spPr>
           <a:xfrm>
-            <a:off x="11498259" y="1856661"/>
+            <a:off x="11628888" y="2431427"/>
             <a:ext cx="274253" cy="0"/>
           </a:xfrm>
           <a:prstGeom prst="straightConnector1">
@@ -6487,7 +6487,7 @@
         </p:nvCxnSpPr>
         <p:spPr>
           <a:xfrm>
-            <a:off x="9327877" y="1871814"/>
+            <a:off x="9458506" y="2446580"/>
             <a:ext cx="388158" cy="0"/>
           </a:xfrm>
           <a:prstGeom prst="straightConnector1">
@@ -6531,7 +6531,7 @@
         </p:nvCxnSpPr>
         <p:spPr>
           <a:xfrm>
-            <a:off x="7663167" y="1856661"/>
+            <a:off x="7793796" y="2431427"/>
             <a:ext cx="388158" cy="0"/>
           </a:xfrm>
           <a:prstGeom prst="straightConnector1">
@@ -6575,7 +6575,7 @@
         </p:nvCxnSpPr>
         <p:spPr>
           <a:xfrm>
-            <a:off x="7663167" y="1182147"/>
+            <a:off x="7793796" y="1756913"/>
             <a:ext cx="388158" cy="0"/>
           </a:xfrm>
           <a:prstGeom prst="straightConnector1">
@@ -6619,7 +6619,7 @@
         </p:nvCxnSpPr>
         <p:spPr>
           <a:xfrm>
-            <a:off x="7676123" y="520167"/>
+            <a:off x="7806752" y="1094933"/>
             <a:ext cx="388158" cy="0"/>
           </a:xfrm>
           <a:prstGeom prst="straightConnector1">
@@ -6663,8 +6663,112 @@
         </p:nvCxnSpPr>
         <p:spPr>
           <a:xfrm>
-            <a:off x="9338747" y="520167"/>
+            <a:off x="9469376" y="1094933"/>
             <a:ext cx="2433765" cy="0"/>
+          </a:xfrm>
+          <a:prstGeom prst="straightConnector1">
+            <a:avLst/>
+          </a:prstGeom>
+          <a:ln w="12700">
+            <a:solidFill>
+              <a:schemeClr val="tx1"/>
+            </a:solidFill>
+            <a:tailEnd type="triangle" w="lg" len="lg"/>
+          </a:ln>
+        </p:spPr>
+        <p:style>
+          <a:lnRef idx="1">
+            <a:schemeClr val="accent1"/>
+          </a:lnRef>
+          <a:fillRef idx="0">
+            <a:schemeClr val="accent1"/>
+          </a:fillRef>
+          <a:effectRef idx="0">
+            <a:schemeClr val="accent1"/>
+          </a:effectRef>
+          <a:fontRef idx="minor">
+            <a:schemeClr val="tx1"/>
+          </a:fontRef>
+        </p:style>
+      </p:cxnSp>
+      <p:sp>
+        <p:nvSpPr>
+          <p:cNvPr id="93" name="Rectangle 92">
+            <a:extLst>
+              <a:ext uri="{FF2B5EF4-FFF2-40B4-BE49-F238E27FC236}">
+                <a16:creationId xmlns:a16="http://schemas.microsoft.com/office/drawing/2014/main" id="{48F8771D-19A5-8D42-B18F-3E1B8E81FB8C}"/>
+              </a:ext>
+            </a:extLst>
+          </p:cNvPr>
+          <p:cNvSpPr/>
+          <p:nvPr/>
+        </p:nvSpPr>
+        <p:spPr>
+          <a:xfrm>
+            <a:off x="6551023" y="161736"/>
+            <a:ext cx="1242586" cy="542878"/>
+          </a:xfrm>
+          <a:prstGeom prst="rect">
+            <a:avLst/>
+          </a:prstGeom>
+          <a:noFill/>
+          <a:ln w="25400">
+            <a:solidFill>
+              <a:schemeClr val="tx1"/>
+            </a:solidFill>
+            <a:prstDash val="dash"/>
+          </a:ln>
+        </p:spPr>
+        <p:style>
+          <a:lnRef idx="2">
+            <a:schemeClr val="accent1">
+              <a:shade val="50000"/>
+            </a:schemeClr>
+          </a:lnRef>
+          <a:fillRef idx="1">
+            <a:schemeClr val="accent1"/>
+          </a:fillRef>
+          <a:effectRef idx="0">
+            <a:schemeClr val="accent1"/>
+          </a:effectRef>
+          <a:fontRef idx="minor">
+            <a:schemeClr val="lt1"/>
+          </a:fontRef>
+        </p:style>
+        <p:txBody>
+          <a:bodyPr rtlCol="0" anchor="ctr"/>
+          <a:lstStyle/>
+          <a:p>
+            <a:pPr algn="ctr"/>
+            <a:r>
+              <a:rPr lang="en-US" dirty="0">
+                <a:solidFill>
+                  <a:schemeClr val="tx1"/>
+                </a:solidFill>
+              </a:rPr>
+              <a:t>Digest Creator</a:t>
+            </a:r>
+          </a:p>
+        </p:txBody>
+      </p:sp>
+      <p:cxnSp>
+        <p:nvCxnSpPr>
+          <p:cNvPr id="94" name="Straight Arrow Connector 93">
+            <a:extLst>
+              <a:ext uri="{FF2B5EF4-FFF2-40B4-BE49-F238E27FC236}">
+                <a16:creationId xmlns:a16="http://schemas.microsoft.com/office/drawing/2014/main" id="{F040EE51-CE26-D042-9E99-AA1BF3C0D18B}"/>
+              </a:ext>
+            </a:extLst>
+          </p:cNvPr>
+          <p:cNvCxnSpPr>
+            <a:cxnSpLocks/>
+          </p:cNvCxnSpPr>
+          <p:nvPr/>
+        </p:nvCxnSpPr>
+        <p:spPr>
+          <a:xfrm>
+            <a:off x="5752063" y="424373"/>
+            <a:ext cx="798961" cy="0"/>
           </a:xfrm>
           <a:prstGeom prst="straightConnector1">
             <a:avLst/>

</xml_diff>